<commit_message>
Added link on 2nd slide
</commit_message>
<xml_diff>
--- a/assets/The Art of Agile Documentation — Presentation — by David Sabine.pptx
+++ b/assets/The Art of Agile Documentation — Presentation — by David Sabine.pptx
@@ -5450,7 +5450,7 @@
           <a:p>
             <a:fld id="{95763BDF-D3ED-46B3-9ECF-8FA0F3E3C62A}" type="datetimeFigureOut">
               <a:rPr lang="en-CA" smtClean="0"/>
-              <a:t>2019-04-25</a:t>
+              <a:t>2019-05-16</a:t>
             </a:fld>
             <a:endParaRPr lang="en-CA"/>
           </a:p>
@@ -8562,7 +8562,7 @@
           <a:p>
             <a:fld id="{083325E5-58DE-48C6-9965-21250A006E51}" type="datetime1">
               <a:rPr lang="en-CA" smtClean="0"/>
-              <a:t>2019-04-25</a:t>
+              <a:t>2019-05-16</a:t>
             </a:fld>
             <a:endParaRPr lang="en-CA"/>
           </a:p>
@@ -8770,7 +8770,7 @@
           <a:p>
             <a:fld id="{3B973A88-4A99-4D63-B057-D63B46DF4DFC}" type="datetime1">
               <a:rPr lang="en-CA" smtClean="0"/>
-              <a:t>2019-04-25</a:t>
+              <a:t>2019-05-16</a:t>
             </a:fld>
             <a:endParaRPr lang="en-CA"/>
           </a:p>
@@ -8988,7 +8988,7 @@
           <a:p>
             <a:fld id="{92CF829B-A66E-4FF5-B87A-23FBCD4BFBFD}" type="datetime1">
               <a:rPr lang="en-CA" smtClean="0"/>
-              <a:t>2019-04-25</a:t>
+              <a:t>2019-05-16</a:t>
             </a:fld>
             <a:endParaRPr lang="en-CA"/>
           </a:p>
@@ -9406,7 +9406,7 @@
           <a:p>
             <a:fld id="{4E43E235-AD3C-46A9-B36E-7BD0B0B69656}" type="datetime1">
               <a:rPr lang="en-CA" smtClean="0"/>
-              <a:t>2019-04-25</a:t>
+              <a:t>2019-05-16</a:t>
             </a:fld>
             <a:endParaRPr lang="en-CA" dirty="0"/>
           </a:p>
@@ -9614,7 +9614,7 @@
           <a:p>
             <a:fld id="{5BA4A058-591E-4094-9828-1079517CB278}" type="datetime1">
               <a:rPr lang="en-CA" smtClean="0"/>
-              <a:t>2019-04-25</a:t>
+              <a:t>2019-05-16</a:t>
             </a:fld>
             <a:endParaRPr lang="en-CA"/>
           </a:p>
@@ -9898,7 +9898,7 @@
           <a:p>
             <a:fld id="{4D217126-1693-4CF8-8AD6-4E67FDEFEBD5}" type="datetime1">
               <a:rPr lang="en-CA" smtClean="0"/>
-              <a:t>2019-04-25</a:t>
+              <a:t>2019-05-16</a:t>
             </a:fld>
             <a:endParaRPr lang="en-CA"/>
           </a:p>
@@ -10174,7 +10174,7 @@
           <a:p>
             <a:fld id="{A6A4EBA7-C4B2-4D1A-832E-BB546FE63970}" type="datetime1">
               <a:rPr lang="en-CA" smtClean="0"/>
-              <a:t>2019-04-25</a:t>
+              <a:t>2019-05-16</a:t>
             </a:fld>
             <a:endParaRPr lang="en-CA"/>
           </a:p>
@@ -10597,7 +10597,7 @@
           <a:p>
             <a:fld id="{4E43E235-AD3C-46A9-B36E-7BD0B0B69656}" type="datetime1">
               <a:rPr lang="en-CA" smtClean="0"/>
-              <a:t>2019-04-25</a:t>
+              <a:t>2019-05-16</a:t>
             </a:fld>
             <a:endParaRPr lang="en-CA" dirty="0"/>
           </a:p>
@@ -10747,7 +10747,7 @@
           <a:p>
             <a:fld id="{5E27445B-9EA3-486F-857E-85BA17D82FCD}" type="datetime1">
               <a:rPr lang="en-CA" smtClean="0"/>
-              <a:t>2019-04-25</a:t>
+              <a:t>2019-05-16</a:t>
             </a:fld>
             <a:endParaRPr lang="en-CA"/>
           </a:p>
@@ -10868,7 +10868,7 @@
           <a:p>
             <a:fld id="{6BBBD15F-E905-474B-A04F-3638F0C11E43}" type="datetime1">
               <a:rPr lang="en-CA" smtClean="0"/>
-              <a:t>2019-04-25</a:t>
+              <a:t>2019-05-16</a:t>
             </a:fld>
             <a:endParaRPr lang="en-CA"/>
           </a:p>
@@ -11189,7 +11189,7 @@
           <a:p>
             <a:fld id="{2F0DC550-C99C-4D32-A69A-789A01E2D7D4}" type="datetime1">
               <a:rPr lang="en-CA" smtClean="0"/>
-              <a:t>2019-04-25</a:t>
+              <a:t>2019-05-16</a:t>
             </a:fld>
             <a:endParaRPr lang="en-CA" dirty="0"/>
           </a:p>
@@ -11490,7 +11490,7 @@
           <a:p>
             <a:fld id="{ABD80965-908C-4B11-A5FF-F6EF6B6466BF}" type="datetime1">
               <a:rPr lang="en-CA" smtClean="0"/>
-              <a:t>2019-04-25</a:t>
+              <a:t>2019-05-16</a:t>
             </a:fld>
             <a:endParaRPr lang="en-CA"/>
           </a:p>
@@ -11741,7 +11741,7 @@
           <a:p>
             <a:fld id="{2F0DC550-C99C-4D32-A69A-789A01E2D7D4}" type="datetime1">
               <a:rPr lang="en-CA" smtClean="0"/>
-              <a:t>2019-04-25</a:t>
+              <a:t>2019-05-16</a:t>
             </a:fld>
             <a:endParaRPr lang="en-CA"/>
           </a:p>
@@ -15316,10 +15316,22 @@
         </p:nvSpPr>
         <p:spPr/>
         <p:txBody>
-          <a:bodyPr/>
+          <a:bodyPr>
+            <a:noAutofit/>
+          </a:bodyPr>
           <a:lstStyle/>
           <a:p>
-            <a:endParaRPr lang="en-CA"/>
+            <a:r>
+              <a:rPr lang="en-CA" sz="4000" dirty="0"/>
+              <a:t>Get these documents at </a:t>
+            </a:r>
+            <a:r>
+              <a:rPr lang="en-CA" sz="6600" dirty="0">
+                <a:hlinkClick r:id="rId3"/>
+              </a:rPr>
+              <a:t>http://bit.ly/2qUPPAO</a:t>
+            </a:r>
+            <a:endParaRPr lang="en-CA" sz="4000" dirty="0"/>
           </a:p>
         </p:txBody>
       </p:sp>
@@ -15364,7 +15376,7 @@
                   <a:srgbClr val="0F79D0"/>
                 </a:solidFill>
                 <a:latin typeface="inherit"/>
-                <a:hlinkClick r:id="rId3"/>
+                <a:hlinkClick r:id="rId4"/>
               </a:rPr>
               <a:t>Creative Commons Attribution-</a:t>
             </a:r>
@@ -15374,7 +15386,7 @@
                   <a:srgbClr val="0F79D0"/>
                 </a:solidFill>
                 <a:latin typeface="inherit"/>
-                <a:hlinkClick r:id="rId3"/>
+                <a:hlinkClick r:id="rId4"/>
               </a:rPr>
               <a:t>ShareAlike</a:t>
             </a:r>
@@ -15384,7 +15396,7 @@
                   <a:srgbClr val="0F79D0"/>
                 </a:solidFill>
                 <a:latin typeface="inherit"/>
-                <a:hlinkClick r:id="rId3"/>
+                <a:hlinkClick r:id="rId4"/>
               </a:rPr>
               <a:t> 4.0 International License</a:t>
             </a:r>
@@ -15406,7 +15418,7 @@
       <p:pic>
         <p:nvPicPr>
           <p:cNvPr id="8" name="Picture 2" descr="Creative Commons License">
-            <a:hlinkClick r:id="rId3"/>
+            <a:hlinkClick r:id="rId4"/>
             <a:extLst>
               <a:ext uri="{FF2B5EF4-FFF2-40B4-BE49-F238E27FC236}">
                 <a16:creationId xmlns:a16="http://schemas.microsoft.com/office/drawing/2014/main" id="{21E563D7-3C53-4E85-B977-9B50256106EE}"/>
@@ -15419,7 +15431,7 @@
           <p:nvPr/>
         </p:nvPicPr>
         <p:blipFill>
-          <a:blip r:embed="rId4">
+          <a:blip r:embed="rId5">
             <a:extLst>
               <a:ext uri="{28A0092B-C50C-407E-A947-70E740481C1C}">
                 <a14:useLocalDpi xmlns:a14="http://schemas.microsoft.com/office/drawing/2010/main" val="0"/>

</xml_diff>